<commit_message>
doc and pdf final update
</commit_message>
<xml_diff>
--- a/doc/Utazó Ügynök.pptx
+++ b/doc/Utazó Ügynök.pptx
@@ -16,7 +16,10 @@
     <p:sldId id="267" r:id="rId10"/>
     <p:sldId id="264" r:id="rId11"/>
     <p:sldId id="265" r:id="rId12"/>
-    <p:sldId id="266" r:id="rId13"/>
+    <p:sldId id="268" r:id="rId13"/>
+    <p:sldId id="269" r:id="rId14"/>
+    <p:sldId id="270" r:id="rId15"/>
+    <p:sldId id="266" r:id="rId16"/>
   </p:sldIdLst>
   <p:sldSz cx="12192000" cy="6858000"/>
   <p:notesSz cx="6858000" cy="9144000"/>
@@ -115,6 +118,11 @@
       </a:defRPr>
     </a:lvl9pPr>
   </p:defaultTextStyle>
+  <p:extLst>
+    <p:ext uri="{EFAFB233-063F-42B5-8137-9DF3F51BA10A}">
+      <p15:sldGuideLst xmlns:p15="http://schemas.microsoft.com/office/powerpoint/2012/main"/>
+    </p:ext>
+  </p:extLst>
 </p:presentation>
 </file>
 
@@ -7810,8 +7818,8 @@
           </a:p>
         </p:txBody>
       </p:sp>
-      <mc:AlternateContent xmlns:mc="http://schemas.openxmlformats.org/markup-compatibility/2006">
-        <mc:Choice xmlns:a14="http://schemas.microsoft.com/office/drawing/2010/main" Requires="a14">
+      <mc:AlternateContent xmlns:mc="http://schemas.openxmlformats.org/markup-compatibility/2006" xmlns:a14="http://schemas.microsoft.com/office/drawing/2010/main">
+        <mc:Choice Requires="a14">
           <p:sp>
             <p:nvSpPr>
               <p:cNvPr id="3" name="Content Placeholder 2"/>
@@ -8105,7 +8113,7 @@
             </p:txBody>
           </p:sp>
         </mc:Choice>
-        <mc:Fallback>
+        <mc:Fallback xmlns="">
           <p:sp>
             <p:nvSpPr>
               <p:cNvPr id="3" name="Content Placeholder 2"/>
@@ -8199,25 +8207,30 @@
           </a:p>
         </p:txBody>
       </p:sp>
-      <p:sp>
-        <p:nvSpPr>
-          <p:cNvPr id="3" name="Content Placeholder 2"/>
-          <p:cNvSpPr>
-            <a:spLocks noGrp="1"/>
-          </p:cNvSpPr>
-          <p:nvPr>
-            <p:ph idx="1"/>
-          </p:nvPr>
-        </p:nvSpPr>
-        <p:spPr/>
-        <p:txBody>
-          <a:bodyPr/>
-          <a:lstStyle/>
-          <a:p>
-            <a:endParaRPr lang="en-US"/>
-          </a:p>
-        </p:txBody>
-      </p:sp>
+      <p:pic>
+        <p:nvPicPr>
+          <p:cNvPr id="4" name="Picture 3"/>
+          <p:cNvPicPr>
+            <a:picLocks noChangeAspect="1"/>
+          </p:cNvPicPr>
+          <p:nvPr/>
+        </p:nvPicPr>
+        <p:blipFill>
+          <a:blip r:embed="rId2"/>
+          <a:stretch>
+            <a:fillRect/>
+          </a:stretch>
+        </p:blipFill>
+        <p:spPr>
+          <a:xfrm>
+            <a:off x="3009256" y="2329119"/>
+            <a:ext cx="7096125" cy="2562225"/>
+          </a:xfrm>
+          <a:prstGeom prst="rect">
+            <a:avLst/>
+          </a:prstGeom>
+        </p:spPr>
+      </p:pic>
     </p:spTree>
     <p:extLst>
       <p:ext uri="{BB962C8B-B14F-4D97-AF65-F5344CB8AC3E}">
@@ -8239,6 +8252,258 @@
 </file>
 
 <file path=ppt/slides/slide12.xml><?xml version="1.0" encoding="utf-8"?>
+<p:sld xmlns:a="http://schemas.openxmlformats.org/drawingml/2006/main" xmlns:r="http://schemas.openxmlformats.org/officeDocument/2006/relationships" xmlns:p="http://schemas.openxmlformats.org/presentationml/2006/main">
+  <p:cSld>
+    <p:spTree>
+      <p:nvGrpSpPr>
+        <p:cNvPr id="1" name=""/>
+        <p:cNvGrpSpPr/>
+        <p:nvPr/>
+      </p:nvGrpSpPr>
+      <p:grpSpPr>
+        <a:xfrm>
+          <a:off x="0" y="0"/>
+          <a:ext cx="0" cy="0"/>
+          <a:chOff x="0" y="0"/>
+          <a:chExt cx="0" cy="0"/>
+        </a:xfrm>
+      </p:grpSpPr>
+      <p:sp>
+        <p:nvSpPr>
+          <p:cNvPr id="2" name="Title 1"/>
+          <p:cNvSpPr>
+            <a:spLocks noGrp="1"/>
+          </p:cNvSpPr>
+          <p:nvPr>
+            <p:ph type="title"/>
+          </p:nvPr>
+        </p:nvSpPr>
+        <p:spPr/>
+        <p:txBody>
+          <a:bodyPr/>
+          <a:lstStyle/>
+          <a:p>
+            <a:r>
+              <a:rPr lang="hu-HU" dirty="0" smtClean="0"/>
+              <a:t>Teszteredmények</a:t>
+            </a:r>
+            <a:endParaRPr lang="en-US" dirty="0"/>
+          </a:p>
+        </p:txBody>
+      </p:sp>
+      <p:pic>
+        <p:nvPicPr>
+          <p:cNvPr id="3" name="Picture 2"/>
+          <p:cNvPicPr>
+            <a:picLocks noChangeAspect="1"/>
+          </p:cNvPicPr>
+          <p:nvPr/>
+        </p:nvPicPr>
+        <p:blipFill>
+          <a:blip r:embed="rId2"/>
+          <a:stretch>
+            <a:fillRect/>
+          </a:stretch>
+        </p:blipFill>
+        <p:spPr>
+          <a:xfrm>
+            <a:off x="2883501" y="1264555"/>
+            <a:ext cx="6540586" cy="5288884"/>
+          </a:xfrm>
+          <a:prstGeom prst="rect">
+            <a:avLst/>
+          </a:prstGeom>
+        </p:spPr>
+      </p:pic>
+    </p:spTree>
+    <p:extLst>
+      <p:ext uri="{BB962C8B-B14F-4D97-AF65-F5344CB8AC3E}">
+        <p14:creationId xmlns:p14="http://schemas.microsoft.com/office/powerpoint/2010/main" val="34868797"/>
+      </p:ext>
+    </p:extLst>
+  </p:cSld>
+  <p:clrMapOvr>
+    <a:masterClrMapping/>
+  </p:clrMapOvr>
+  <p:timing>
+    <p:tnLst>
+      <p:par>
+        <p:cTn id="1" dur="indefinite" restart="never" nodeType="tmRoot"/>
+      </p:par>
+    </p:tnLst>
+  </p:timing>
+</p:sld>
+</file>
+
+<file path=ppt/slides/slide13.xml><?xml version="1.0" encoding="utf-8"?>
+<p:sld xmlns:a="http://schemas.openxmlformats.org/drawingml/2006/main" xmlns:r="http://schemas.openxmlformats.org/officeDocument/2006/relationships" xmlns:p="http://schemas.openxmlformats.org/presentationml/2006/main">
+  <p:cSld>
+    <p:spTree>
+      <p:nvGrpSpPr>
+        <p:cNvPr id="1" name=""/>
+        <p:cNvGrpSpPr/>
+        <p:nvPr/>
+      </p:nvGrpSpPr>
+      <p:grpSpPr>
+        <a:xfrm>
+          <a:off x="0" y="0"/>
+          <a:ext cx="0" cy="0"/>
+          <a:chOff x="0" y="0"/>
+          <a:chExt cx="0" cy="0"/>
+        </a:xfrm>
+      </p:grpSpPr>
+      <p:sp>
+        <p:nvSpPr>
+          <p:cNvPr id="2" name="Title 1"/>
+          <p:cNvSpPr>
+            <a:spLocks noGrp="1"/>
+          </p:cNvSpPr>
+          <p:nvPr>
+            <p:ph type="title"/>
+          </p:nvPr>
+        </p:nvSpPr>
+        <p:spPr/>
+        <p:txBody>
+          <a:bodyPr/>
+          <a:lstStyle/>
+          <a:p>
+            <a:r>
+              <a:rPr lang="hu-HU" dirty="0" smtClean="0"/>
+              <a:t>Teszteredmények</a:t>
+            </a:r>
+            <a:endParaRPr lang="en-US" dirty="0"/>
+          </a:p>
+        </p:txBody>
+      </p:sp>
+      <p:pic>
+        <p:nvPicPr>
+          <p:cNvPr id="3" name="Picture 2"/>
+          <p:cNvPicPr>
+            <a:picLocks noChangeAspect="1"/>
+          </p:cNvPicPr>
+          <p:nvPr/>
+        </p:nvPicPr>
+        <p:blipFill>
+          <a:blip r:embed="rId2"/>
+          <a:stretch>
+            <a:fillRect/>
+          </a:stretch>
+        </p:blipFill>
+        <p:spPr>
+          <a:xfrm>
+            <a:off x="2592925" y="1264555"/>
+            <a:ext cx="7467600" cy="5057775"/>
+          </a:xfrm>
+          <a:prstGeom prst="rect">
+            <a:avLst/>
+          </a:prstGeom>
+        </p:spPr>
+      </p:pic>
+    </p:spTree>
+    <p:extLst>
+      <p:ext uri="{BB962C8B-B14F-4D97-AF65-F5344CB8AC3E}">
+        <p14:creationId xmlns:p14="http://schemas.microsoft.com/office/powerpoint/2010/main" val="4112918964"/>
+      </p:ext>
+    </p:extLst>
+  </p:cSld>
+  <p:clrMapOvr>
+    <a:masterClrMapping/>
+  </p:clrMapOvr>
+  <p:timing>
+    <p:tnLst>
+      <p:par>
+        <p:cTn id="1" dur="indefinite" restart="never" nodeType="tmRoot"/>
+      </p:par>
+    </p:tnLst>
+  </p:timing>
+</p:sld>
+</file>
+
+<file path=ppt/slides/slide14.xml><?xml version="1.0" encoding="utf-8"?>
+<p:sld xmlns:a="http://schemas.openxmlformats.org/drawingml/2006/main" xmlns:r="http://schemas.openxmlformats.org/officeDocument/2006/relationships" xmlns:p="http://schemas.openxmlformats.org/presentationml/2006/main">
+  <p:cSld>
+    <p:spTree>
+      <p:nvGrpSpPr>
+        <p:cNvPr id="1" name=""/>
+        <p:cNvGrpSpPr/>
+        <p:nvPr/>
+      </p:nvGrpSpPr>
+      <p:grpSpPr>
+        <a:xfrm>
+          <a:off x="0" y="0"/>
+          <a:ext cx="0" cy="0"/>
+          <a:chOff x="0" y="0"/>
+          <a:chExt cx="0" cy="0"/>
+        </a:xfrm>
+      </p:grpSpPr>
+      <p:sp>
+        <p:nvSpPr>
+          <p:cNvPr id="2" name="Title 1"/>
+          <p:cNvSpPr>
+            <a:spLocks noGrp="1"/>
+          </p:cNvSpPr>
+          <p:nvPr>
+            <p:ph type="title"/>
+          </p:nvPr>
+        </p:nvSpPr>
+        <p:spPr/>
+        <p:txBody>
+          <a:bodyPr/>
+          <a:lstStyle/>
+          <a:p>
+            <a:r>
+              <a:rPr lang="hu-HU" dirty="0" smtClean="0"/>
+              <a:t>Teszteredmények</a:t>
+            </a:r>
+            <a:endParaRPr lang="en-US" dirty="0"/>
+          </a:p>
+        </p:txBody>
+      </p:sp>
+      <p:pic>
+        <p:nvPicPr>
+          <p:cNvPr id="4" name="Picture 3"/>
+          <p:cNvPicPr>
+            <a:picLocks noChangeAspect="1"/>
+          </p:cNvPicPr>
+          <p:nvPr/>
+        </p:nvPicPr>
+        <p:blipFill>
+          <a:blip r:embed="rId2"/>
+          <a:stretch>
+            <a:fillRect/>
+          </a:stretch>
+        </p:blipFill>
+        <p:spPr>
+          <a:xfrm>
+            <a:off x="2592925" y="1264555"/>
+            <a:ext cx="6847637" cy="5208965"/>
+          </a:xfrm>
+          <a:prstGeom prst="rect">
+            <a:avLst/>
+          </a:prstGeom>
+        </p:spPr>
+      </p:pic>
+    </p:spTree>
+    <p:extLst>
+      <p:ext uri="{BB962C8B-B14F-4D97-AF65-F5344CB8AC3E}">
+        <p14:creationId xmlns:p14="http://schemas.microsoft.com/office/powerpoint/2010/main" val="3515354112"/>
+      </p:ext>
+    </p:extLst>
+  </p:cSld>
+  <p:clrMapOvr>
+    <a:masterClrMapping/>
+  </p:clrMapOvr>
+  <p:timing>
+    <p:tnLst>
+      <p:par>
+        <p:cTn id="1" dur="indefinite" restart="never" nodeType="tmRoot"/>
+      </p:par>
+    </p:tnLst>
+  </p:timing>
+</p:sld>
+</file>
+
+<file path=ppt/slides/slide15.xml><?xml version="1.0" encoding="utf-8"?>
 <p:sld xmlns:a="http://schemas.openxmlformats.org/drawingml/2006/main" xmlns:r="http://schemas.openxmlformats.org/officeDocument/2006/relationships" xmlns:p="http://schemas.openxmlformats.org/presentationml/2006/main">
   <p:cSld>
     <p:spTree>

</xml_diff>